<commit_message>
New version with Redgate info and minor changes
</commit_message>
<xml_diff>
--- a/Relational Database Design/Relational Database Design.pptx
+++ b/Relational Database Design/Relational Database Design.pptx
@@ -257,7 +257,7 @@
 <file path=ppt/revisionInfo.xml><?xml version="1.0" encoding="utf-8"?>
 <p1510:revInfo xmlns:a="http://schemas.openxmlformats.org/drawingml/2006/main" xmlns:r="http://schemas.openxmlformats.org/officeDocument/2006/relationships" xmlns:p1510="http://schemas.microsoft.com/office/powerpoint/2015/10/main">
   <p1510:revLst>
-    <p1510:client id="{891766BD-546D-40C6-A3E1-B613B63B699F}" v="683" dt="2020-07-08T14:34:01.888"/>
+    <p1510:client id="{3473E52E-BC73-4920-8D33-568E34CFE9F9}" v="565" dt="2023-07-15T02:02:18.629"/>
   </p1510:revLst>
 </p1510:revInfo>
 </file>
@@ -265,23 +265,304 @@
 <file path=ppt/changesInfos/changesInfo1.xml><?xml version="1.0" encoding="utf-8"?>
 <pc:chgInfo xmlns:a="http://schemas.openxmlformats.org/drawingml/2006/main" xmlns:r="http://schemas.openxmlformats.org/officeDocument/2006/relationships" xmlns:ac="http://schemas.microsoft.com/office/drawing/2013/main/command" xmlns:pc="http://schemas.microsoft.com/office/powerpoint/2013/main/command">
   <pc:docChgLst>
-    <pc:chgData name="Louis Davidson" userId="80677fb08b3162e4" providerId="LiveId" clId="{47377BA0-BF41-4F02-B812-FCE6A1B40477}"/>
+    <pc:chgData name="Louis Davidson" userId="80677fb08b3162e4" providerId="LiveId" clId="{27E8B08A-1D10-44F4-AF37-41B622C8789F}"/>
+    <pc:docChg chg="undo redo custSel mod addSld delSld modSld sldOrd">
+      <pc:chgData name="Louis Davidson" userId="80677fb08b3162e4" providerId="LiveId" clId="{27E8B08A-1D10-44F4-AF37-41B622C8789F}" dt="2019-10-22T19:32:55.014" v="934" actId="20577"/>
+      <pc:docMkLst>
+        <pc:docMk/>
+      </pc:docMkLst>
+      <pc:sldChg chg="modSp modAnim">
+        <pc:chgData name="Louis Davidson" userId="80677fb08b3162e4" providerId="LiveId" clId="{27E8B08A-1D10-44F4-AF37-41B622C8789F}" dt="2019-10-22T19:32:55.014" v="934" actId="20577"/>
+        <pc:sldMkLst>
+          <pc:docMk/>
+          <pc:sldMk cId="929612929" sldId="540"/>
+        </pc:sldMkLst>
+        <pc:spChg chg="mod">
+          <ac:chgData name="Louis Davidson" userId="80677fb08b3162e4" providerId="LiveId" clId="{27E8B08A-1D10-44F4-AF37-41B622C8789F}" dt="2019-10-22T19:32:55.014" v="934" actId="20577"/>
+          <ac:spMkLst>
+            <pc:docMk/>
+            <pc:sldMk cId="929612929" sldId="540"/>
+            <ac:spMk id="3" creationId="{00000000-0000-0000-0000-000000000000}"/>
+          </ac:spMkLst>
+        </pc:spChg>
+      </pc:sldChg>
+    </pc:docChg>
   </pc:docChgLst>
   <pc:docChgLst>
-    <pc:chgData name="Louis Davidson" userId="80677fb08b3162e4" providerId="LiveId" clId="{891766BD-546D-40C6-A3E1-B613B63B699F}"/>
+    <pc:chgData name="Louis Davidson" userId="80677fb08b3162e4" providerId="LiveId" clId="{3473E52E-BC73-4920-8D33-568E34CFE9F9}"/>
     <pc:docChg chg="custSel modSld">
-      <pc:chgData name="Louis Davidson" userId="80677fb08b3162e4" providerId="LiveId" clId="{891766BD-546D-40C6-A3E1-B613B63B699F}" dt="2020-07-08T14:34:01.888" v="703" actId="20577"/>
+      <pc:chgData name="Louis Davidson" userId="80677fb08b3162e4" providerId="LiveId" clId="{3473E52E-BC73-4920-8D33-568E34CFE9F9}" dt="2023-07-15T02:11:06.120" v="634" actId="729"/>
       <pc:docMkLst>
         <pc:docMk/>
       </pc:docMkLst>
       <pc:sldChg chg="modSp">
-        <pc:chgData name="Louis Davidson" userId="80677fb08b3162e4" providerId="LiveId" clId="{891766BD-546D-40C6-A3E1-B613B63B699F}" dt="2020-05-16T15:12:47.496" v="13" actId="20577"/>
+        <pc:chgData name="Louis Davidson" userId="80677fb08b3162e4" providerId="LiveId" clId="{3473E52E-BC73-4920-8D33-568E34CFE9F9}" dt="2023-07-15T01:56:55.204" v="585" actId="20577"/>
+        <pc:sldMkLst>
+          <pc:docMk/>
+          <pc:sldMk cId="513239003" sldId="412"/>
+        </pc:sldMkLst>
+        <pc:spChg chg="mod">
+          <ac:chgData name="Louis Davidson" userId="80677fb08b3162e4" providerId="LiveId" clId="{3473E52E-BC73-4920-8D33-568E34CFE9F9}" dt="2023-07-15T01:56:55.204" v="585" actId="20577"/>
+          <ac:spMkLst>
+            <pc:docMk/>
+            <pc:sldMk cId="513239003" sldId="412"/>
+            <ac:spMk id="3" creationId="{00000000-0000-0000-0000-000000000000}"/>
+          </ac:spMkLst>
+        </pc:spChg>
+      </pc:sldChg>
+      <pc:sldChg chg="modSp mod">
+        <pc:chgData name="Louis Davidson" userId="80677fb08b3162e4" providerId="LiveId" clId="{3473E52E-BC73-4920-8D33-568E34CFE9F9}" dt="2023-07-14T00:16:34.094" v="20" actId="20577"/>
+        <pc:sldMkLst>
+          <pc:docMk/>
+          <pc:sldMk cId="432255601" sldId="470"/>
+        </pc:sldMkLst>
+        <pc:spChg chg="mod">
+          <ac:chgData name="Louis Davidson" userId="80677fb08b3162e4" providerId="LiveId" clId="{3473E52E-BC73-4920-8D33-568E34CFE9F9}" dt="2023-07-14T00:16:34.094" v="20" actId="20577"/>
+          <ac:spMkLst>
+            <pc:docMk/>
+            <pc:sldMk cId="432255601" sldId="470"/>
+            <ac:spMk id="14339" creationId="{00000000-0000-0000-0000-000000000000}"/>
+          </ac:spMkLst>
+        </pc:spChg>
+      </pc:sldChg>
+      <pc:sldChg chg="modAnim">
+        <pc:chgData name="Louis Davidson" userId="80677fb08b3162e4" providerId="LiveId" clId="{3473E52E-BC73-4920-8D33-568E34CFE9F9}" dt="2023-07-14T02:26:59.661" v="130"/>
+        <pc:sldMkLst>
+          <pc:docMk/>
+          <pc:sldMk cId="2953545930" sldId="485"/>
+        </pc:sldMkLst>
+      </pc:sldChg>
+      <pc:sldChg chg="modSp">
+        <pc:chgData name="Louis Davidson" userId="80677fb08b3162e4" providerId="LiveId" clId="{3473E52E-BC73-4920-8D33-568E34CFE9F9}" dt="2023-07-15T02:02:18.629" v="630" actId="20577"/>
+        <pc:sldMkLst>
+          <pc:docMk/>
+          <pc:sldMk cId="789618714" sldId="492"/>
+        </pc:sldMkLst>
+        <pc:spChg chg="mod">
+          <ac:chgData name="Louis Davidson" userId="80677fb08b3162e4" providerId="LiveId" clId="{3473E52E-BC73-4920-8D33-568E34CFE9F9}" dt="2023-07-15T02:02:18.629" v="630" actId="20577"/>
+          <ac:spMkLst>
+            <pc:docMk/>
+            <pc:sldMk cId="789618714" sldId="492"/>
+            <ac:spMk id="3" creationId="{00000000-0000-0000-0000-000000000000}"/>
+          </ac:spMkLst>
+        </pc:spChg>
+      </pc:sldChg>
+      <pc:sldChg chg="mod modShow">
+        <pc:chgData name="Louis Davidson" userId="80677fb08b3162e4" providerId="LiveId" clId="{3473E52E-BC73-4920-8D33-568E34CFE9F9}" dt="2023-07-15T02:10:09.688" v="631" actId="729"/>
+        <pc:sldMkLst>
+          <pc:docMk/>
+          <pc:sldMk cId="2921873892" sldId="496"/>
+        </pc:sldMkLst>
+      </pc:sldChg>
+      <pc:sldChg chg="mod modShow">
+        <pc:chgData name="Louis Davidson" userId="80677fb08b3162e4" providerId="LiveId" clId="{3473E52E-BC73-4920-8D33-568E34CFE9F9}" dt="2023-07-15T02:10:26.630" v="632" actId="729"/>
+        <pc:sldMkLst>
+          <pc:docMk/>
+          <pc:sldMk cId="2923986508" sldId="499"/>
+        </pc:sldMkLst>
+      </pc:sldChg>
+      <pc:sldChg chg="mod modShow">
+        <pc:chgData name="Louis Davidson" userId="80677fb08b3162e4" providerId="LiveId" clId="{3473E52E-BC73-4920-8D33-568E34CFE9F9}" dt="2023-07-15T02:10:58.058" v="633" actId="729"/>
+        <pc:sldMkLst>
+          <pc:docMk/>
+          <pc:sldMk cId="1197814394" sldId="500"/>
+        </pc:sldMkLst>
+      </pc:sldChg>
+      <pc:sldChg chg="mod modShow">
+        <pc:chgData name="Louis Davidson" userId="80677fb08b3162e4" providerId="LiveId" clId="{3473E52E-BC73-4920-8D33-568E34CFE9F9}" dt="2023-07-15T02:11:06.120" v="634" actId="729"/>
+        <pc:sldMkLst>
+          <pc:docMk/>
+          <pc:sldMk cId="996559049" sldId="501"/>
+        </pc:sldMkLst>
+      </pc:sldChg>
+      <pc:sldChg chg="modSp mod modAnim">
+        <pc:chgData name="Louis Davidson" userId="80677fb08b3162e4" providerId="LiveId" clId="{3473E52E-BC73-4920-8D33-568E34CFE9F9}" dt="2023-07-14T02:57:17.938" v="378" actId="1076"/>
+        <pc:sldMkLst>
+          <pc:docMk/>
+          <pc:sldMk cId="2469829145" sldId="513"/>
+        </pc:sldMkLst>
+        <pc:spChg chg="mod">
+          <ac:chgData name="Louis Davidson" userId="80677fb08b3162e4" providerId="LiveId" clId="{3473E52E-BC73-4920-8D33-568E34CFE9F9}" dt="2023-07-14T02:57:13.716" v="377" actId="27636"/>
+          <ac:spMkLst>
+            <pc:docMk/>
+            <pc:sldMk cId="2469829145" sldId="513"/>
+            <ac:spMk id="115715" creationId="{00000000-0000-0000-0000-000000000000}"/>
+          </ac:spMkLst>
+        </pc:spChg>
+        <pc:picChg chg="mod">
+          <ac:chgData name="Louis Davidson" userId="80677fb08b3162e4" providerId="LiveId" clId="{3473E52E-BC73-4920-8D33-568E34CFE9F9}" dt="2023-07-14T02:57:17.938" v="378" actId="1076"/>
+          <ac:picMkLst>
+            <pc:docMk/>
+            <pc:sldMk cId="2469829145" sldId="513"/>
+            <ac:picMk id="2" creationId="{00000000-0000-0000-0000-000000000000}"/>
+          </ac:picMkLst>
+        </pc:picChg>
+      </pc:sldChg>
+      <pc:sldChg chg="modSp mod">
+        <pc:chgData name="Louis Davidson" userId="80677fb08b3162e4" providerId="LiveId" clId="{3473E52E-BC73-4920-8D33-568E34CFE9F9}" dt="2023-07-14T02:30:45.314" v="281" actId="20577"/>
+        <pc:sldMkLst>
+          <pc:docMk/>
+          <pc:sldMk cId="3404747201" sldId="527"/>
+        </pc:sldMkLst>
+        <pc:spChg chg="mod">
+          <ac:chgData name="Louis Davidson" userId="80677fb08b3162e4" providerId="LiveId" clId="{3473E52E-BC73-4920-8D33-568E34CFE9F9}" dt="2023-07-14T02:29:11.444" v="151" actId="20577"/>
+          <ac:spMkLst>
+            <pc:docMk/>
+            <pc:sldMk cId="3404747201" sldId="527"/>
+            <ac:spMk id="2" creationId="{00000000-0000-0000-0000-000000000000}"/>
+          </ac:spMkLst>
+        </pc:spChg>
+        <pc:spChg chg="mod">
+          <ac:chgData name="Louis Davidson" userId="80677fb08b3162e4" providerId="LiveId" clId="{3473E52E-BC73-4920-8D33-568E34CFE9F9}" dt="2023-07-14T02:29:50.850" v="267" actId="1076"/>
+          <ac:spMkLst>
+            <pc:docMk/>
+            <pc:sldMk cId="3404747201" sldId="527"/>
+            <ac:spMk id="4" creationId="{00000000-0000-0000-0000-000000000000}"/>
+          </ac:spMkLst>
+        </pc:spChg>
+        <pc:spChg chg="mod">
+          <ac:chgData name="Louis Davidson" userId="80677fb08b3162e4" providerId="LiveId" clId="{3473E52E-BC73-4920-8D33-568E34CFE9F9}" dt="2023-07-14T02:30:45.314" v="281" actId="20577"/>
+          <ac:spMkLst>
+            <pc:docMk/>
+            <pc:sldMk cId="3404747201" sldId="527"/>
+            <ac:spMk id="6" creationId="{A7653A51-9653-4E2E-BD88-FBBE75303A00}"/>
+          </ac:spMkLst>
+        </pc:spChg>
+      </pc:sldChg>
+      <pc:sldChg chg="addSp delSp modSp mod modAnim">
+        <pc:chgData name="Louis Davidson" userId="80677fb08b3162e4" providerId="LiveId" clId="{3473E52E-BC73-4920-8D33-568E34CFE9F9}" dt="2023-07-15T01:41:55.505" v="544" actId="5793"/>
+        <pc:sldMkLst>
+          <pc:docMk/>
+          <pc:sldMk cId="929612929" sldId="540"/>
+        </pc:sldMkLst>
+        <pc:spChg chg="mod">
+          <ac:chgData name="Louis Davidson" userId="80677fb08b3162e4" providerId="LiveId" clId="{3473E52E-BC73-4920-8D33-568E34CFE9F9}" dt="2023-07-15T01:41:55.505" v="544" actId="5793"/>
+          <ac:spMkLst>
+            <pc:docMk/>
+            <pc:sldMk cId="929612929" sldId="540"/>
+            <ac:spMk id="3" creationId="{00000000-0000-0000-0000-000000000000}"/>
+          </ac:spMkLst>
+        </pc:spChg>
+        <pc:spChg chg="add del mod">
+          <ac:chgData name="Louis Davidson" userId="80677fb08b3162e4" providerId="LiveId" clId="{3473E52E-BC73-4920-8D33-568E34CFE9F9}" dt="2023-07-14T00:17:40.778" v="24" actId="478"/>
+          <ac:spMkLst>
+            <pc:docMk/>
+            <pc:sldMk cId="929612929" sldId="540"/>
+            <ac:spMk id="5" creationId="{DA873DFB-7E53-CAE8-7AAC-FAF66CBFBB02}"/>
+          </ac:spMkLst>
+        </pc:spChg>
+        <pc:picChg chg="add mod">
+          <ac:chgData name="Louis Davidson" userId="80677fb08b3162e4" providerId="LiveId" clId="{3473E52E-BC73-4920-8D33-568E34CFE9F9}" dt="2023-07-14T00:17:48.726" v="28" actId="1076"/>
+          <ac:picMkLst>
+            <pc:docMk/>
+            <pc:sldMk cId="929612929" sldId="540"/>
+            <ac:picMk id="7" creationId="{54851473-A269-1E6C-53A7-F41E1F79E846}"/>
+          </ac:picMkLst>
+        </pc:picChg>
+        <pc:picChg chg="del">
+          <ac:chgData name="Louis Davidson" userId="80677fb08b3162e4" providerId="LiveId" clId="{3473E52E-BC73-4920-8D33-568E34CFE9F9}" dt="2023-07-14T00:17:19.107" v="21" actId="478"/>
+          <ac:picMkLst>
+            <pc:docMk/>
+            <pc:sldMk cId="929612929" sldId="540"/>
+            <ac:picMk id="1026" creationId="{00000000-0000-0000-0000-000000000000}"/>
+          </ac:picMkLst>
+        </pc:picChg>
+      </pc:sldChg>
+    </pc:docChg>
+  </pc:docChgLst>
+  <pc:docChgLst>
+    <pc:chgData name="Louis Davidson" userId="80677fb08b3162e4" providerId="LiveId" clId="{56FCBDD2-0363-48FE-8F31-3A8CE2BFEDB5}"/>
+    <pc:docChg chg="modSld">
+      <pc:chgData name="Louis Davidson" userId="80677fb08b3162e4" providerId="LiveId" clId="{56FCBDD2-0363-48FE-8F31-3A8CE2BFEDB5}" dt="2020-01-18T03:44:02.237" v="4"/>
+      <pc:docMkLst>
+        <pc:docMk/>
+      </pc:docMkLst>
+      <pc:sldChg chg="modTransition">
+        <pc:chgData name="Louis Davidson" userId="80677fb08b3162e4" providerId="LiveId" clId="{56FCBDD2-0363-48FE-8F31-3A8CE2BFEDB5}" dt="2020-01-18T03:44:02.237" v="4"/>
+        <pc:sldMkLst>
+          <pc:docMk/>
+          <pc:sldMk cId="1890353652" sldId="364"/>
+        </pc:sldMkLst>
+      </pc:sldChg>
+      <pc:sldChg chg="modTransition">
+        <pc:chgData name="Louis Davidson" userId="80677fb08b3162e4" providerId="LiveId" clId="{56FCBDD2-0363-48FE-8F31-3A8CE2BFEDB5}" dt="2020-01-18T03:41:34.171" v="3"/>
+        <pc:sldMkLst>
+          <pc:docMk/>
+          <pc:sldMk cId="3413390703" sldId="454"/>
+        </pc:sldMkLst>
+      </pc:sldChg>
+      <pc:sldChg chg="modAnim">
+        <pc:chgData name="Louis Davidson" userId="80677fb08b3162e4" providerId="LiveId" clId="{56FCBDD2-0363-48FE-8F31-3A8CE2BFEDB5}" dt="2020-01-18T03:23:39.700" v="2"/>
+        <pc:sldMkLst>
+          <pc:docMk/>
+          <pc:sldMk cId="3741972685" sldId="543"/>
+        </pc:sldMkLst>
+      </pc:sldChg>
+    </pc:docChg>
+  </pc:docChgLst>
+  <pc:docChgLst>
+    <pc:chgData name="Louis Davidson" userId="80677fb08b3162e4" providerId="LiveId" clId="{64C29975-84D0-4057-A90F-09985EA40BE5}"/>
+    <pc:docChg chg="modSld">
+      <pc:chgData name="Louis Davidson" userId="80677fb08b3162e4" providerId="LiveId" clId="{64C29975-84D0-4057-A90F-09985EA40BE5}" dt="2021-11-08T16:58:09.061" v="0" actId="20577"/>
+      <pc:docMkLst>
+        <pc:docMk/>
+      </pc:docMkLst>
+      <pc:sldChg chg="modSp">
+        <pc:chgData name="Louis Davidson" userId="80677fb08b3162e4" providerId="LiveId" clId="{64C29975-84D0-4057-A90F-09985EA40BE5}" dt="2021-11-08T16:58:09.061" v="0" actId="20577"/>
+        <pc:sldMkLst>
+          <pc:docMk/>
+          <pc:sldMk cId="0" sldId="271"/>
+        </pc:sldMkLst>
+        <pc:spChg chg="mod">
+          <ac:chgData name="Louis Davidson" userId="80677fb08b3162e4" providerId="LiveId" clId="{64C29975-84D0-4057-A90F-09985EA40BE5}" dt="2021-11-08T16:58:09.061" v="0" actId="20577"/>
+          <ac:spMkLst>
+            <pc:docMk/>
+            <pc:sldMk cId="0" sldId="271"/>
+            <ac:spMk id="31747" creationId="{00000000-0000-0000-0000-000000000000}"/>
+          </ac:spMkLst>
+        </pc:spChg>
+      </pc:sldChg>
+    </pc:docChg>
+  </pc:docChgLst>
+  <pc:docChgLst>
+    <pc:chgData name="Louis Davidson" userId="80677fb08b3162e4" providerId="LiveId" clId="{CEE4E162-4062-504A-BB7F-58CB179DB1B4}"/>
+    <pc:docChg chg="modSld">
+      <pc:chgData name="Louis Davidson" userId="80677fb08b3162e4" providerId="LiveId" clId="{CEE4E162-4062-504A-BB7F-58CB179DB1B4}" dt="2020-01-17T22:59:17.610" v="4" actId="1076"/>
+      <pc:docMkLst>
+        <pc:docMk/>
+      </pc:docMkLst>
+      <pc:sldChg chg="modSp">
+        <pc:chgData name="Louis Davidson" userId="80677fb08b3162e4" providerId="LiveId" clId="{CEE4E162-4062-504A-BB7F-58CB179DB1B4}" dt="2020-01-17T22:59:17.610" v="4" actId="1076"/>
+        <pc:sldMkLst>
+          <pc:docMk/>
+          <pc:sldMk cId="4155624380" sldId="493"/>
+        </pc:sldMkLst>
+        <pc:spChg chg="mod">
+          <ac:chgData name="Louis Davidson" userId="80677fb08b3162e4" providerId="LiveId" clId="{CEE4E162-4062-504A-BB7F-58CB179DB1B4}" dt="2020-01-17T22:59:17.610" v="4" actId="1076"/>
+          <ac:spMkLst>
+            <pc:docMk/>
+            <pc:sldMk cId="4155624380" sldId="493"/>
+            <ac:spMk id="3" creationId="{00000000-0000-0000-0000-000000000000}"/>
+          </ac:spMkLst>
+        </pc:spChg>
+      </pc:sldChg>
+    </pc:docChg>
+  </pc:docChgLst>
+  <pc:docChgLst>
+    <pc:chgData name="Louis Davidson" userId="80677fb08b3162e4" providerId="LiveId" clId="{891766BD-546D-40C6-A3E1-B613B63B699F}"/>
+    <pc:docChg chg="undo redo custSel modSld modMainMaster">
+      <pc:chgData name="Louis Davidson" userId="80677fb08b3162e4" providerId="LiveId" clId="{891766BD-546D-40C6-A3E1-B613B63B699F}" dt="2020-07-17T19:22:10.192" v="728"/>
+      <pc:docMkLst>
+        <pc:docMk/>
+      </pc:docMkLst>
+      <pc:sldChg chg="modSp">
+        <pc:chgData name="Louis Davidson" userId="80677fb08b3162e4" providerId="LiveId" clId="{891766BD-546D-40C6-A3E1-B613B63B699F}" dt="2020-07-17T19:22:10.192" v="728"/>
         <pc:sldMkLst>
           <pc:docMk/>
           <pc:sldMk cId="440603153" sldId="353"/>
         </pc:sldMkLst>
         <pc:spChg chg="mod">
-          <ac:chgData name="Louis Davidson" userId="80677fb08b3162e4" providerId="LiveId" clId="{891766BD-546D-40C6-A3E1-B613B63B699F}" dt="2020-05-16T15:12:47.496" v="13" actId="20577"/>
+          <ac:chgData name="Louis Davidson" userId="80677fb08b3162e4" providerId="LiveId" clId="{891766BD-546D-40C6-A3E1-B613B63B699F}" dt="2020-07-17T19:22:10.192" v="728"/>
           <ac:spMkLst>
             <pc:docMk/>
             <pc:sldMk cId="440603153" sldId="353"/>
@@ -318,6 +599,21 @@
           <pc:sldMk cId="1216059987" sldId="396"/>
         </pc:sldMkLst>
       </pc:sldChg>
+      <pc:sldChg chg="modSp">
+        <pc:chgData name="Louis Davidson" userId="80677fb08b3162e4" providerId="LiveId" clId="{891766BD-546D-40C6-A3E1-B613B63B699F}" dt="2020-07-17T19:22:10.192" v="728"/>
+        <pc:sldMkLst>
+          <pc:docMk/>
+          <pc:sldMk cId="513239003" sldId="412"/>
+        </pc:sldMkLst>
+        <pc:spChg chg="mod">
+          <ac:chgData name="Louis Davidson" userId="80677fb08b3162e4" providerId="LiveId" clId="{891766BD-546D-40C6-A3E1-B613B63B699F}" dt="2020-07-17T19:22:10.192" v="728"/>
+          <ac:spMkLst>
+            <pc:docMk/>
+            <pc:sldMk cId="513239003" sldId="412"/>
+            <ac:spMk id="3" creationId="{00000000-0000-0000-0000-000000000000}"/>
+          </ac:spMkLst>
+        </pc:spChg>
+      </pc:sldChg>
       <pc:sldChg chg="modTransition">
         <pc:chgData name="Louis Davidson" userId="80677fb08b3162e4" providerId="LiveId" clId="{891766BD-546D-40C6-A3E1-B613B63B699F}" dt="2020-05-16T16:00:00.055" v="679"/>
         <pc:sldMkLst>
@@ -332,6 +628,36 @@
           <pc:sldMk cId="3011347919" sldId="435"/>
         </pc:sldMkLst>
       </pc:sldChg>
+      <pc:sldChg chg="modSp">
+        <pc:chgData name="Louis Davidson" userId="80677fb08b3162e4" providerId="LiveId" clId="{891766BD-546D-40C6-A3E1-B613B63B699F}" dt="2020-07-17T19:22:10.192" v="728"/>
+        <pc:sldMkLst>
+          <pc:docMk/>
+          <pc:sldMk cId="2959606888" sldId="440"/>
+        </pc:sldMkLst>
+        <pc:spChg chg="mod">
+          <ac:chgData name="Louis Davidson" userId="80677fb08b3162e4" providerId="LiveId" clId="{891766BD-546D-40C6-A3E1-B613B63B699F}" dt="2020-07-17T19:22:10.192" v="728"/>
+          <ac:spMkLst>
+            <pc:docMk/>
+            <pc:sldMk cId="2959606888" sldId="440"/>
+            <ac:spMk id="3" creationId="{00000000-0000-0000-0000-000000000000}"/>
+          </ac:spMkLst>
+        </pc:spChg>
+      </pc:sldChg>
+      <pc:sldChg chg="modSp">
+        <pc:chgData name="Louis Davidson" userId="80677fb08b3162e4" providerId="LiveId" clId="{891766BD-546D-40C6-A3E1-B613B63B699F}" dt="2020-07-17T19:22:10.192" v="728"/>
+        <pc:sldMkLst>
+          <pc:docMk/>
+          <pc:sldMk cId="1576248056" sldId="449"/>
+        </pc:sldMkLst>
+        <pc:spChg chg="mod">
+          <ac:chgData name="Louis Davidson" userId="80677fb08b3162e4" providerId="LiveId" clId="{891766BD-546D-40C6-A3E1-B613B63B699F}" dt="2020-07-17T19:22:10.192" v="728"/>
+          <ac:spMkLst>
+            <pc:docMk/>
+            <pc:sldMk cId="1576248056" sldId="449"/>
+            <ac:spMk id="7" creationId="{00000000-0000-0000-0000-000000000000}"/>
+          </ac:spMkLst>
+        </pc:spChg>
+      </pc:sldChg>
       <pc:sldChg chg="modTransition">
         <pc:chgData name="Louis Davidson" userId="80677fb08b3162e4" providerId="LiveId" clId="{891766BD-546D-40C6-A3E1-B613B63B699F}" dt="2020-05-16T15:59:47.011" v="677"/>
         <pc:sldMkLst>
@@ -339,15 +665,38 @@
           <pc:sldMk cId="406330519" sldId="452"/>
         </pc:sldMkLst>
       </pc:sldChg>
-      <pc:sldChg chg="modAnim">
-        <pc:chgData name="Louis Davidson" userId="80677fb08b3162e4" providerId="LiveId" clId="{891766BD-546D-40C6-A3E1-B613B63B699F}" dt="2020-05-16T16:56:52.874" v="688"/>
+      <pc:sldChg chg="modSp">
+        <pc:chgData name="Louis Davidson" userId="80677fb08b3162e4" providerId="LiveId" clId="{891766BD-546D-40C6-A3E1-B613B63B699F}" dt="2020-07-17T19:22:10.192" v="728"/>
+        <pc:sldMkLst>
+          <pc:docMk/>
+          <pc:sldMk cId="3413390703" sldId="454"/>
+        </pc:sldMkLst>
+        <pc:spChg chg="mod">
+          <ac:chgData name="Louis Davidson" userId="80677fb08b3162e4" providerId="LiveId" clId="{891766BD-546D-40C6-A3E1-B613B63B699F}" dt="2020-07-17T19:22:10.192" v="728"/>
+          <ac:spMkLst>
+            <pc:docMk/>
+            <pc:sldMk cId="3413390703" sldId="454"/>
+            <ac:spMk id="3" creationId="{00000000-0000-0000-0000-000000000000}"/>
+          </ac:spMkLst>
+        </pc:spChg>
+      </pc:sldChg>
+      <pc:sldChg chg="modSp modAnim">
+        <pc:chgData name="Louis Davidson" userId="80677fb08b3162e4" providerId="LiveId" clId="{891766BD-546D-40C6-A3E1-B613B63B699F}" dt="2020-07-17T19:22:10.192" v="728"/>
         <pc:sldMkLst>
           <pc:docMk/>
           <pc:sldMk cId="2953545930" sldId="485"/>
         </pc:sldMkLst>
+        <pc:spChg chg="mod">
+          <ac:chgData name="Louis Davidson" userId="80677fb08b3162e4" providerId="LiveId" clId="{891766BD-546D-40C6-A3E1-B613B63B699F}" dt="2020-07-17T19:22:10.192" v="728"/>
+          <ac:spMkLst>
+            <pc:docMk/>
+            <pc:sldMk cId="2953545930" sldId="485"/>
+            <ac:spMk id="3" creationId="{00000000-0000-0000-0000-000000000000}"/>
+          </ac:spMkLst>
+        </pc:spChg>
       </pc:sldChg>
       <pc:sldChg chg="modSp modAnim">
-        <pc:chgData name="Louis Davidson" userId="80677fb08b3162e4" providerId="LiveId" clId="{891766BD-546D-40C6-A3E1-B613B63B699F}" dt="2020-05-16T15:47:25.084" v="260" actId="20577"/>
+        <pc:chgData name="Louis Davidson" userId="80677fb08b3162e4" providerId="LiveId" clId="{891766BD-546D-40C6-A3E1-B613B63B699F}" dt="2020-07-17T19:22:10.192" v="728"/>
         <pc:sldMkLst>
           <pc:docMk/>
           <pc:sldMk cId="630654941" sldId="487"/>
@@ -361,7 +710,7 @@
           </ac:spMkLst>
         </pc:spChg>
         <pc:spChg chg="mod">
-          <ac:chgData name="Louis Davidson" userId="80677fb08b3162e4" providerId="LiveId" clId="{891766BD-546D-40C6-A3E1-B613B63B699F}" dt="2020-05-16T15:47:04.021" v="228" actId="14"/>
+          <ac:chgData name="Louis Davidson" userId="80677fb08b3162e4" providerId="LiveId" clId="{891766BD-546D-40C6-A3E1-B613B63B699F}" dt="2020-07-17T19:22:10.192" v="728"/>
           <ac:spMkLst>
             <pc:docMk/>
             <pc:sldMk cId="630654941" sldId="487"/>
@@ -405,12 +754,42 @@
           <pc:sldMk cId="996559049" sldId="501"/>
         </pc:sldMkLst>
       </pc:sldChg>
+      <pc:sldChg chg="modSp">
+        <pc:chgData name="Louis Davidson" userId="80677fb08b3162e4" providerId="LiveId" clId="{891766BD-546D-40C6-A3E1-B613B63B699F}" dt="2020-07-17T19:22:10.192" v="728"/>
+        <pc:sldMkLst>
+          <pc:docMk/>
+          <pc:sldMk cId="4021785894" sldId="505"/>
+        </pc:sldMkLst>
+        <pc:spChg chg="mod">
+          <ac:chgData name="Louis Davidson" userId="80677fb08b3162e4" providerId="LiveId" clId="{891766BD-546D-40C6-A3E1-B613B63B699F}" dt="2020-07-17T19:22:10.192" v="728"/>
+          <ac:spMkLst>
+            <pc:docMk/>
+            <pc:sldMk cId="4021785894" sldId="505"/>
+            <ac:spMk id="6" creationId="{00000000-0000-0000-0000-000000000000}"/>
+          </ac:spMkLst>
+        </pc:spChg>
+      </pc:sldChg>
       <pc:sldChg chg="modTransition">
         <pc:chgData name="Louis Davidson" userId="80677fb08b3162e4" providerId="LiveId" clId="{891766BD-546D-40C6-A3E1-B613B63B699F}" dt="2020-05-16T15:45:40.381" v="187"/>
         <pc:sldMkLst>
           <pc:docMk/>
           <pc:sldMk cId="2374212822" sldId="518"/>
         </pc:sldMkLst>
+      </pc:sldChg>
+      <pc:sldChg chg="modSp">
+        <pc:chgData name="Louis Davidson" userId="80677fb08b3162e4" providerId="LiveId" clId="{891766BD-546D-40C6-A3E1-B613B63B699F}" dt="2020-07-17T19:22:10.192" v="728"/>
+        <pc:sldMkLst>
+          <pc:docMk/>
+          <pc:sldMk cId="162630690" sldId="519"/>
+        </pc:sldMkLst>
+        <pc:spChg chg="mod">
+          <ac:chgData name="Louis Davidson" userId="80677fb08b3162e4" providerId="LiveId" clId="{891766BD-546D-40C6-A3E1-B613B63B699F}" dt="2020-07-17T19:22:10.192" v="728"/>
+          <ac:spMkLst>
+            <pc:docMk/>
+            <pc:sldMk cId="162630690" sldId="519"/>
+            <ac:spMk id="3" creationId="{00000000-0000-0000-0000-000000000000}"/>
+          </ac:spMkLst>
+        </pc:spChg>
       </pc:sldChg>
       <pc:sldChg chg="modSp">
         <pc:chgData name="Louis Davidson" userId="80677fb08b3162e4" providerId="LiveId" clId="{891766BD-546D-40C6-A3E1-B613B63B699F}" dt="2020-05-16T15:58:07.446" v="672" actId="167"/>
@@ -435,12 +814,42 @@
           </ac:picMkLst>
         </pc:picChg>
       </pc:sldChg>
+      <pc:sldChg chg="modSp">
+        <pc:chgData name="Louis Davidson" userId="80677fb08b3162e4" providerId="LiveId" clId="{891766BD-546D-40C6-A3E1-B613B63B699F}" dt="2020-07-17T19:22:10.192" v="728"/>
+        <pc:sldMkLst>
+          <pc:docMk/>
+          <pc:sldMk cId="2351436046" sldId="529"/>
+        </pc:sldMkLst>
+        <pc:spChg chg="mod">
+          <ac:chgData name="Louis Davidson" userId="80677fb08b3162e4" providerId="LiveId" clId="{891766BD-546D-40C6-A3E1-B613B63B699F}" dt="2020-07-17T19:22:10.192" v="728"/>
+          <ac:spMkLst>
+            <pc:docMk/>
+            <pc:sldMk cId="2351436046" sldId="529"/>
+            <ac:spMk id="7" creationId="{00000000-0000-0000-0000-000000000000}"/>
+          </ac:spMkLst>
+        </pc:spChg>
+      </pc:sldChg>
       <pc:sldChg chg="modAnim">
         <pc:chgData name="Louis Davidson" userId="80677fb08b3162e4" providerId="LiveId" clId="{891766BD-546D-40C6-A3E1-B613B63B699F}" dt="2020-05-16T15:44:48.059" v="186"/>
         <pc:sldMkLst>
           <pc:docMk/>
           <pc:sldMk cId="110293033" sldId="534"/>
         </pc:sldMkLst>
+      </pc:sldChg>
+      <pc:sldChg chg="modSp">
+        <pc:chgData name="Louis Davidson" userId="80677fb08b3162e4" providerId="LiveId" clId="{891766BD-546D-40C6-A3E1-B613B63B699F}" dt="2020-07-17T19:22:10.192" v="728"/>
+        <pc:sldMkLst>
+          <pc:docMk/>
+          <pc:sldMk cId="1449490543" sldId="538"/>
+        </pc:sldMkLst>
+        <pc:spChg chg="mod">
+          <ac:chgData name="Louis Davidson" userId="80677fb08b3162e4" providerId="LiveId" clId="{891766BD-546D-40C6-A3E1-B613B63B699F}" dt="2020-07-17T19:22:10.192" v="728"/>
+          <ac:spMkLst>
+            <pc:docMk/>
+            <pc:sldMk cId="1449490543" sldId="538"/>
+            <ac:spMk id="2" creationId="{00000000-0000-0000-0000-000000000000}"/>
+          </ac:spMkLst>
+        </pc:spChg>
       </pc:sldChg>
       <pc:sldChg chg="modSp">
         <pc:chgData name="Louis Davidson" userId="80677fb08b3162e4" providerId="LiveId" clId="{891766BD-546D-40C6-A3E1-B613B63B699F}" dt="2020-07-08T14:34:01.888" v="703" actId="20577"/>
@@ -479,87 +888,21 @@
           </ac:spMkLst>
         </pc:spChg>
       </pc:sldChg>
-    </pc:docChg>
-  </pc:docChgLst>
-  <pc:docChgLst>
-    <pc:chgData name="Louis Davidson" userId="80677fb08b3162e4" providerId="LiveId" clId="{56FCBDD2-0363-48FE-8F31-3A8CE2BFEDB5}"/>
-    <pc:docChg chg="modSld">
-      <pc:chgData name="Louis Davidson" userId="80677fb08b3162e4" providerId="LiveId" clId="{56FCBDD2-0363-48FE-8F31-3A8CE2BFEDB5}" dt="2020-01-18T03:44:02.237" v="4"/>
-      <pc:docMkLst>
-        <pc:docMk/>
-      </pc:docMkLst>
-      <pc:sldChg chg="modTransition">
-        <pc:chgData name="Louis Davidson" userId="80677fb08b3162e4" providerId="LiveId" clId="{56FCBDD2-0363-48FE-8F31-3A8CE2BFEDB5}" dt="2020-01-18T03:44:02.237" v="4"/>
-        <pc:sldMkLst>
+      <pc:sldMasterChg chg="addSp">
+        <pc:chgData name="Louis Davidson" userId="80677fb08b3162e4" providerId="LiveId" clId="{891766BD-546D-40C6-A3E1-B613B63B699F}" dt="2020-07-17T19:16:37.313" v="704"/>
+        <pc:sldMasterMkLst>
           <pc:docMk/>
-          <pc:sldMk cId="1890353652" sldId="364"/>
-        </pc:sldMkLst>
-      </pc:sldChg>
-      <pc:sldChg chg="modTransition">
-        <pc:chgData name="Louis Davidson" userId="80677fb08b3162e4" providerId="LiveId" clId="{56FCBDD2-0363-48FE-8F31-3A8CE2BFEDB5}" dt="2020-01-18T03:41:34.171" v="3"/>
-        <pc:sldMkLst>
-          <pc:docMk/>
-          <pc:sldMk cId="3413390703" sldId="454"/>
-        </pc:sldMkLst>
-      </pc:sldChg>
-      <pc:sldChg chg="modAnim">
-        <pc:chgData name="Louis Davidson" userId="80677fb08b3162e4" providerId="LiveId" clId="{56FCBDD2-0363-48FE-8F31-3A8CE2BFEDB5}" dt="2020-01-18T03:23:39.700" v="2"/>
-        <pc:sldMkLst>
-          <pc:docMk/>
-          <pc:sldMk cId="3741972685" sldId="543"/>
-        </pc:sldMkLst>
-      </pc:sldChg>
-    </pc:docChg>
-  </pc:docChgLst>
-  <pc:docChgLst>
-    <pc:chgData name="Louis Davidson" userId="80677fb08b3162e4" providerId="LiveId" clId="{CEE4E162-4062-504A-BB7F-58CB179DB1B4}"/>
-    <pc:docChg chg="modSld">
-      <pc:chgData name="Louis Davidson" userId="80677fb08b3162e4" providerId="LiveId" clId="{CEE4E162-4062-504A-BB7F-58CB179DB1B4}" dt="2020-01-17T22:59:17.610" v="4" actId="1076"/>
-      <pc:docMkLst>
-        <pc:docMk/>
-      </pc:docMkLst>
-      <pc:sldChg chg="modSp">
-        <pc:chgData name="Louis Davidson" userId="80677fb08b3162e4" providerId="LiveId" clId="{CEE4E162-4062-504A-BB7F-58CB179DB1B4}" dt="2020-01-17T22:59:17.610" v="4" actId="1076"/>
-        <pc:sldMkLst>
-          <pc:docMk/>
-          <pc:sldMk cId="4155624380" sldId="493"/>
-        </pc:sldMkLst>
-        <pc:spChg chg="mod">
-          <ac:chgData name="Louis Davidson" userId="80677fb08b3162e4" providerId="LiveId" clId="{CEE4E162-4062-504A-BB7F-58CB179DB1B4}" dt="2020-01-17T22:59:17.610" v="4" actId="1076"/>
+          <pc:sldMasterMk cId="2958977573" sldId="2147483814"/>
+        </pc:sldMasterMkLst>
+        <pc:spChg chg="add">
+          <ac:chgData name="Louis Davidson" userId="80677fb08b3162e4" providerId="LiveId" clId="{891766BD-546D-40C6-A3E1-B613B63B699F}" dt="2020-07-17T19:16:37.313" v="704"/>
           <ac:spMkLst>
             <pc:docMk/>
-            <pc:sldMk cId="4155624380" sldId="493"/>
-            <ac:spMk id="3" creationId="{00000000-0000-0000-0000-000000000000}"/>
+            <pc:sldMasterMk cId="2958977573" sldId="2147483814"/>
+            <ac:spMk id="3" creationId="{BB0E1512-426D-4AF3-821C-48A20D8CBF8A}"/>
           </ac:spMkLst>
         </pc:spChg>
-      </pc:sldChg>
-    </pc:docChg>
-  </pc:docChgLst>
-  <pc:docChgLst>
-    <pc:chgData name="Louis Davidson" userId="80677fb08b3162e4" providerId="LiveId" clId="{5493CA6B-E36C-49A9-A193-1B6924933580}"/>
-  </pc:docChgLst>
-  <pc:docChgLst>
-    <pc:chgData name="Louis Davidson" userId="80677fb08b3162e4" providerId="LiveId" clId="{27E8B08A-1D10-44F4-AF37-41B622C8789F}"/>
-    <pc:docChg chg="undo redo custSel mod addSld delSld modSld sldOrd">
-      <pc:chgData name="Louis Davidson" userId="80677fb08b3162e4" providerId="LiveId" clId="{27E8B08A-1D10-44F4-AF37-41B622C8789F}" dt="2019-10-22T19:32:55.014" v="934" actId="20577"/>
-      <pc:docMkLst>
-        <pc:docMk/>
-      </pc:docMkLst>
-      <pc:sldChg chg="modSp modAnim">
-        <pc:chgData name="Louis Davidson" userId="80677fb08b3162e4" providerId="LiveId" clId="{27E8B08A-1D10-44F4-AF37-41B622C8789F}" dt="2019-10-22T19:32:55.014" v="934" actId="20577"/>
-        <pc:sldMkLst>
-          <pc:docMk/>
-          <pc:sldMk cId="929612929" sldId="540"/>
-        </pc:sldMkLst>
-        <pc:spChg chg="mod">
-          <ac:chgData name="Louis Davidson" userId="80677fb08b3162e4" providerId="LiveId" clId="{27E8B08A-1D10-44F4-AF37-41B622C8789F}" dt="2019-10-22T19:32:55.014" v="934" actId="20577"/>
-          <ac:spMkLst>
-            <pc:docMk/>
-            <pc:sldMk cId="929612929" sldId="540"/>
-            <ac:spMk id="3" creationId="{00000000-0000-0000-0000-000000000000}"/>
-          </ac:spMkLst>
-        </pc:spChg>
-      </pc:sldChg>
+      </pc:sldMasterChg>
     </pc:docChg>
   </pc:docChgLst>
 </pc:chgInfo>
@@ -648,7 +991,7 @@
             <a:fld id="{69AAF921-3120-46EF-9D70-8F50D16977CF}" type="datetimeFigureOut">
               <a:rPr lang="en-US" smtClean="0"/>
               <a:pPr/>
-              <a:t>7/8/2020</a:t>
+              <a:t>7/14/2023</a:t>
             </a:fld>
             <a:endParaRPr lang="en-US"/>
           </a:p>
@@ -5892,7 +6235,7 @@
           <a:p>
             <a:r>
               <a:rPr lang="en-US" dirty="0"/>
-              <a:t>drsql.org</a:t>
+              <a:t>simple-talk.com</a:t>
             </a:r>
           </a:p>
           <a:p>
@@ -10507,37 +10850,37 @@
         </p:nvSpPr>
         <p:spPr>
           <a:xfrm>
-            <a:off x="609600" y="1600206"/>
-            <a:ext cx="5874327" cy="4952994"/>
+            <a:off x="609600" y="1396428"/>
+            <a:ext cx="6172200" cy="5156772"/>
           </a:xfrm>
         </p:spPr>
         <p:txBody>
           <a:bodyPr>
-            <a:normAutofit fontScale="77500" lnSpcReduction="20000"/>
+            <a:normAutofit fontScale="70000" lnSpcReduction="20000"/>
           </a:bodyPr>
           <a:lstStyle/>
           <a:p>
             <a:r>
               <a:rPr lang="en-US" dirty="0"/>
-              <a:t>Been in IT for 20-some years</a:t>
+              <a:t>Database programmer/architect &gt; 20 years</a:t>
             </a:r>
           </a:p>
           <a:p>
             <a:r>
               <a:rPr lang="en-US" dirty="0"/>
-              <a:t>Microsoft MVP 15 Times</a:t>
+              <a:t>Microsoft MVP 19 Times</a:t>
             </a:r>
           </a:p>
           <a:p>
             <a:r>
               <a:rPr lang="en-US" dirty="0"/>
-              <a:t>Corporate Data Architect</a:t>
+              <a:t>Simple-Talk.com Editor</a:t>
             </a:r>
           </a:p>
           <a:p>
             <a:r>
               <a:rPr lang="en-US" dirty="0"/>
-              <a:t>Written 5 books on </a:t>
+              <a:t>Written 6 books on </a:t>
             </a:r>
             <a:br>
               <a:rPr lang="en-US" dirty="0"/>
@@ -10579,7 +10922,7 @@
             <a:pPr lvl="1"/>
             <a:r>
               <a:rPr lang="en-US" dirty="0"/>
-              <a:t>Working on the Sixth Edition</a:t>
+              <a:t>Seventh Edition? Who knows</a:t>
             </a:r>
           </a:p>
           <a:p>
@@ -10597,6 +10940,23 @@
             <a:r>
               <a:rPr lang="en-US" dirty="0"/>
               <a:t>Twitter, Website (.org), Email (@hotmail.com)</a:t>
+            </a:r>
+          </a:p>
+          <a:p>
+            <a:pPr lvl="1"/>
+            <a:endParaRPr lang="en-US" dirty="0"/>
+          </a:p>
+          <a:p>
+            <a:r>
+              <a:rPr lang="en-US" dirty="0"/>
+              <a:t>Article writing interest?</a:t>
+            </a:r>
+          </a:p>
+          <a:p>
+            <a:pPr lvl="1"/>
+            <a:r>
+              <a:rPr lang="en-US" dirty="0"/>
+              <a:t>editor@simple-talk.com</a:t>
             </a:r>
           </a:p>
           <a:p>
@@ -10609,43 +10969,32 @@
       </p:sp>
       <p:pic>
         <p:nvPicPr>
-          <p:cNvPr id="1026" name="Picture 2" descr="http://i.ebayimg.com/00/s/NzE0WDUwMA==/z/mCcAAOSwDiBZGwjA/$_57.JPG?set_id=880000500F"/>
+          <p:cNvPr id="7" name="Picture 6">
+            <a:extLst>
+              <a:ext uri="{FF2B5EF4-FFF2-40B4-BE49-F238E27FC236}">
+                <a16:creationId xmlns:a16="http://schemas.microsoft.com/office/drawing/2014/main" id="{54851473-A269-1E6C-53A7-F41E1F79E846}"/>
+              </a:ext>
+            </a:extLst>
+          </p:cNvPr>
           <p:cNvPicPr>
-            <a:picLocks noChangeAspect="1" noChangeArrowheads="1"/>
+            <a:picLocks noChangeAspect="1"/>
           </p:cNvPicPr>
           <p:nvPr/>
         </p:nvPicPr>
         <p:blipFill>
-          <a:blip r:embed="rId3">
-            <a:extLst>
-              <a:ext uri="{28A0092B-C50C-407E-A947-70E740481C1C}">
-                <a14:useLocalDpi xmlns:a14="http://schemas.microsoft.com/office/drawing/2010/main" val="0"/>
-              </a:ext>
-            </a:extLst>
-          </a:blip>
-          <a:srcRect/>
+          <a:blip r:embed="rId3"/>
           <a:stretch>
             <a:fillRect/>
           </a:stretch>
         </p:blipFill>
-        <p:spPr bwMode="auto">
+        <p:spPr>
           <a:xfrm>
-            <a:off x="7086600" y="1295400"/>
-            <a:ext cx="3789767" cy="5411787"/>
+            <a:off x="7239000" y="1396428"/>
+            <a:ext cx="3554429" cy="4895195"/>
           </a:xfrm>
           <a:prstGeom prst="rect">
             <a:avLst/>
           </a:prstGeom>
-          <a:noFill/>
-          <a:extLst>
-            <a:ext uri="{909E8E84-426E-40DD-AFC4-6F175D3DCCD1}">
-              <a14:hiddenFill xmlns:a14="http://schemas.microsoft.com/office/drawing/2010/main">
-                <a:solidFill>
-                  <a:srgbClr val="FFFFFF"/>
-                </a:solidFill>
-              </a14:hiddenFill>
-            </a:ext>
-          </a:extLst>
         </p:spPr>
       </p:pic>
     </p:spTree>
@@ -11021,27 +11370,40 @@
                             </p:childTnLst>
                           </p:cTn>
                         </p:par>
+                      </p:childTnLst>
+                    </p:cTn>
+                  </p:par>
+                  <p:par>
+                    <p:cTn id="30" fill="hold">
+                      <p:stCondLst>
+                        <p:cond delay="indefinite"/>
+                      </p:stCondLst>
+                      <p:childTnLst>
                         <p:par>
-                          <p:cTn id="30" fill="hold">
+                          <p:cTn id="31" fill="hold">
                             <p:stCondLst>
-                              <p:cond delay="500"/>
+                              <p:cond delay="0"/>
                             </p:stCondLst>
                             <p:childTnLst>
                               <p:par>
-                                <p:cTn id="31" presetID="10" presetClass="entr" presetSubtype="0" fill="hold" nodeType="afterEffect">
+                                <p:cTn id="32" presetID="10" presetClass="entr" presetSubtype="0" fill="hold" grpId="0" nodeType="clickEffect">
                                   <p:stCondLst>
                                     <p:cond delay="0"/>
                                   </p:stCondLst>
                                   <p:childTnLst>
                                     <p:set>
                                       <p:cBhvr>
-                                        <p:cTn id="32" dur="1" fill="hold">
+                                        <p:cTn id="33" dur="1" fill="hold">
                                           <p:stCondLst>
                                             <p:cond delay="0"/>
                                           </p:stCondLst>
                                         </p:cTn>
                                         <p:tgtEl>
-                                          <p:spTgt spid="1026"/>
+                                          <p:spTgt spid="3">
+                                            <p:txEl>
+                                              <p:pRg st="8" end="8"/>
+                                            </p:txEl>
+                                          </p:spTgt>
                                         </p:tgtEl>
                                         <p:attrNameLst>
                                           <p:attrName>style.visibility</p:attrName>
@@ -11053,9 +11415,56 @@
                                     </p:set>
                                     <p:animEffect transition="in" filter="fade">
                                       <p:cBhvr>
-                                        <p:cTn id="33" dur="500"/>
-                                        <p:tgtEl>
-                                          <p:spTgt spid="1026"/>
+                                        <p:cTn id="34" dur="500"/>
+                                        <p:tgtEl>
+                                          <p:spTgt spid="3">
+                                            <p:txEl>
+                                              <p:pRg st="8" end="8"/>
+                                            </p:txEl>
+                                          </p:spTgt>
+                                        </p:tgtEl>
+                                      </p:cBhvr>
+                                    </p:animEffect>
+                                  </p:childTnLst>
+                                </p:cTn>
+                              </p:par>
+                              <p:par>
+                                <p:cTn id="35" presetID="10" presetClass="entr" presetSubtype="0" fill="hold" grpId="0" nodeType="withEffect">
+                                  <p:stCondLst>
+                                    <p:cond delay="0"/>
+                                  </p:stCondLst>
+                                  <p:childTnLst>
+                                    <p:set>
+                                      <p:cBhvr>
+                                        <p:cTn id="36" dur="1" fill="hold">
+                                          <p:stCondLst>
+                                            <p:cond delay="0"/>
+                                          </p:stCondLst>
+                                        </p:cTn>
+                                        <p:tgtEl>
+                                          <p:spTgt spid="3">
+                                            <p:txEl>
+                                              <p:pRg st="9" end="9"/>
+                                            </p:txEl>
+                                          </p:spTgt>
+                                        </p:tgtEl>
+                                        <p:attrNameLst>
+                                          <p:attrName>style.visibility</p:attrName>
+                                        </p:attrNameLst>
+                                      </p:cBhvr>
+                                      <p:to>
+                                        <p:strVal val="visible"/>
+                                      </p:to>
+                                    </p:set>
+                                    <p:animEffect transition="in" filter="fade">
+                                      <p:cBhvr>
+                                        <p:cTn id="37" dur="500"/>
+                                        <p:tgtEl>
+                                          <p:spTgt spid="3">
+                                            <p:txEl>
+                                              <p:pRg st="9" end="9"/>
+                                            </p:txEl>
+                                          </p:spTgt>
                                         </p:tgtEl>
                                       </p:cBhvr>
                                     </p:animEffect>
@@ -11069,26 +11478,26 @@
                     </p:cTn>
                   </p:par>
                   <p:par>
-                    <p:cTn id="34" fill="hold">
+                    <p:cTn id="38" fill="hold">
                       <p:stCondLst>
                         <p:cond delay="indefinite"/>
                       </p:stCondLst>
                       <p:childTnLst>
                         <p:par>
-                          <p:cTn id="35" fill="hold">
+                          <p:cTn id="39" fill="hold">
                             <p:stCondLst>
                               <p:cond delay="0"/>
                             </p:stCondLst>
                             <p:childTnLst>
                               <p:par>
-                                <p:cTn id="36" presetID="10" presetClass="entr" presetSubtype="0" fill="hold" grpId="0" nodeType="clickEffect">
+                                <p:cTn id="40" presetID="10" presetClass="entr" presetSubtype="0" fill="hold" grpId="0" nodeType="clickEffect">
                                   <p:stCondLst>
                                     <p:cond delay="0"/>
                                   </p:stCondLst>
                                   <p:childTnLst>
                                     <p:set>
                                       <p:cBhvr>
-                                        <p:cTn id="37" dur="1" fill="hold">
+                                        <p:cTn id="41" dur="1" fill="hold">
                                           <p:stCondLst>
                                             <p:cond delay="0"/>
                                           </p:stCondLst>
@@ -11096,7 +11505,7 @@
                                         <p:tgtEl>
                                           <p:spTgt spid="3">
                                             <p:txEl>
-                                              <p:pRg st="8" end="8"/>
+                                              <p:pRg st="11" end="11"/>
                                             </p:txEl>
                                           </p:spTgt>
                                         </p:tgtEl>
@@ -11110,11 +11519,11 @@
                                     </p:set>
                                     <p:animEffect transition="in" filter="fade">
                                       <p:cBhvr>
-                                        <p:cTn id="38" dur="500"/>
+                                        <p:cTn id="42" dur="500"/>
                                         <p:tgtEl>
                                           <p:spTgt spid="3">
                                             <p:txEl>
-                                              <p:pRg st="8" end="8"/>
+                                              <p:pRg st="11" end="11"/>
                                             </p:txEl>
                                           </p:spTgt>
                                         </p:tgtEl>
@@ -11124,14 +11533,14 @@
                                 </p:cTn>
                               </p:par>
                               <p:par>
-                                <p:cTn id="39" presetID="10" presetClass="entr" presetSubtype="0" fill="hold" grpId="0" nodeType="withEffect">
+                                <p:cTn id="43" presetID="10" presetClass="entr" presetSubtype="0" fill="hold" grpId="0" nodeType="withEffect">
                                   <p:stCondLst>
                                     <p:cond delay="0"/>
                                   </p:stCondLst>
                                   <p:childTnLst>
                                     <p:set>
                                       <p:cBhvr>
-                                        <p:cTn id="40" dur="1" fill="hold">
+                                        <p:cTn id="44" dur="1" fill="hold">
                                           <p:stCondLst>
                                             <p:cond delay="0"/>
                                           </p:stCondLst>
@@ -11139,7 +11548,7 @@
                                         <p:tgtEl>
                                           <p:spTgt spid="3">
                                             <p:txEl>
-                                              <p:pRg st="9" end="9"/>
+                                              <p:pRg st="12" end="12"/>
                                             </p:txEl>
                                           </p:spTgt>
                                         </p:tgtEl>
@@ -11153,11 +11562,11 @@
                                     </p:set>
                                     <p:animEffect transition="in" filter="fade">
                                       <p:cBhvr>
-                                        <p:cTn id="41" dur="500"/>
+                                        <p:cTn id="45" dur="500"/>
                                         <p:tgtEl>
                                           <p:spTgt spid="3">
                                             <p:txEl>
-                                              <p:pRg st="9" end="9"/>
+                                              <p:pRg st="12" end="12"/>
                                             </p:txEl>
                                           </p:spTgt>
                                         </p:tgtEl>
@@ -11287,7 +11696,7 @@
           <a:p>
             <a:r>
               <a:rPr lang="en-US" dirty="0"/>
-              <a:t>Basically: Understand what is good data, and what is NOT good data. </a:t>
+              <a:t>Basically: Understand what is good data, what is NOT good data, and what probably isn’t good data. </a:t>
             </a:r>
           </a:p>
           <a:p>
@@ -12982,15 +13391,33 @@
                                   </p:childTnLst>
                                 </p:cTn>
                               </p:par>
+                            </p:childTnLst>
+                          </p:cTn>
+                        </p:par>
+                      </p:childTnLst>
+                    </p:cTn>
+                  </p:par>
+                  <p:par>
+                    <p:cTn id="23" fill="hold">
+                      <p:stCondLst>
+                        <p:cond delay="indefinite"/>
+                      </p:stCondLst>
+                      <p:childTnLst>
+                        <p:par>
+                          <p:cTn id="24" fill="hold">
+                            <p:stCondLst>
+                              <p:cond delay="0"/>
+                            </p:stCondLst>
+                            <p:childTnLst>
                               <p:par>
-                                <p:cTn id="23" presetID="10" presetClass="entr" presetSubtype="0" fill="hold" grpId="0" nodeType="withEffect">
+                                <p:cTn id="25" presetID="10" presetClass="entr" presetSubtype="0" fill="hold" grpId="0" nodeType="clickEffect">
                                   <p:stCondLst>
                                     <p:cond delay="0"/>
                                   </p:stCondLst>
                                   <p:childTnLst>
                                     <p:set>
                                       <p:cBhvr>
-                                        <p:cTn id="24" dur="1" fill="hold">
+                                        <p:cTn id="26" dur="1" fill="hold">
                                           <p:stCondLst>
                                             <p:cond delay="0"/>
                                           </p:stCondLst>
@@ -12998,7 +13425,7 @@
                                         <p:tgtEl>
                                           <p:spTgt spid="3">
                                             <p:txEl>
-                                              <p:pRg st="9" end="9"/>
+                                              <p:pRg st="6" end="6"/>
                                             </p:txEl>
                                           </p:spTgt>
                                         </p:tgtEl>
@@ -13012,11 +13439,11 @@
                                     </p:set>
                                     <p:animEffect transition="in" filter="fade">
                                       <p:cBhvr>
-                                        <p:cTn id="25" dur="500"/>
+                                        <p:cTn id="27" dur="500"/>
                                         <p:tgtEl>
                                           <p:spTgt spid="3">
                                             <p:txEl>
-                                              <p:pRg st="9" end="9"/>
+                                              <p:pRg st="6" end="6"/>
                                             </p:txEl>
                                           </p:spTgt>
                                         </p:tgtEl>
@@ -13032,26 +13459,26 @@
                     </p:cTn>
                   </p:par>
                   <p:par>
-                    <p:cTn id="26" fill="hold">
+                    <p:cTn id="28" fill="hold">
                       <p:stCondLst>
                         <p:cond delay="indefinite"/>
                       </p:stCondLst>
                       <p:childTnLst>
                         <p:par>
-                          <p:cTn id="27" fill="hold">
+                          <p:cTn id="29" fill="hold">
                             <p:stCondLst>
                               <p:cond delay="0"/>
                             </p:stCondLst>
                             <p:childTnLst>
                               <p:par>
-                                <p:cTn id="28" presetID="10" presetClass="entr" presetSubtype="0" fill="hold" grpId="0" nodeType="clickEffect">
+                                <p:cTn id="30" presetID="10" presetClass="entr" presetSubtype="0" fill="hold" grpId="0" nodeType="clickEffect">
                                   <p:stCondLst>
                                     <p:cond delay="0"/>
                                   </p:stCondLst>
                                   <p:childTnLst>
                                     <p:set>
                                       <p:cBhvr>
-                                        <p:cTn id="29" dur="1" fill="hold">
+                                        <p:cTn id="31" dur="1" fill="hold">
                                           <p:stCondLst>
                                             <p:cond delay="0"/>
                                           </p:stCondLst>
@@ -13059,7 +13486,7 @@
                                         <p:tgtEl>
                                           <p:spTgt spid="3">
                                             <p:txEl>
-                                              <p:pRg st="6" end="6"/>
+                                              <p:pRg st="5" end="5"/>
                                             </p:txEl>
                                           </p:spTgt>
                                         </p:tgtEl>
@@ -13073,11 +13500,11 @@
                                     </p:set>
                                     <p:animEffect transition="in" filter="fade">
                                       <p:cBhvr>
-                                        <p:cTn id="30" dur="500"/>
+                                        <p:cTn id="32" dur="500"/>
                                         <p:tgtEl>
                                           <p:spTgt spid="3">
                                             <p:txEl>
-                                              <p:pRg st="6" end="6"/>
+                                              <p:pRg st="5" end="5"/>
                                             </p:txEl>
                                           </p:spTgt>
                                         </p:tgtEl>
@@ -13093,26 +13520,26 @@
                     </p:cTn>
                   </p:par>
                   <p:par>
-                    <p:cTn id="31" fill="hold">
+                    <p:cTn id="33" fill="hold">
                       <p:stCondLst>
                         <p:cond delay="indefinite"/>
                       </p:stCondLst>
                       <p:childTnLst>
                         <p:par>
-                          <p:cTn id="32" fill="hold">
+                          <p:cTn id="34" fill="hold">
                             <p:stCondLst>
                               <p:cond delay="0"/>
                             </p:stCondLst>
                             <p:childTnLst>
                               <p:par>
-                                <p:cTn id="33" presetID="10" presetClass="entr" presetSubtype="0" fill="hold" grpId="0" nodeType="clickEffect">
+                                <p:cTn id="35" presetID="10" presetClass="entr" presetSubtype="0" fill="hold" grpId="0" nodeType="clickEffect">
                                   <p:stCondLst>
                                     <p:cond delay="0"/>
                                   </p:stCondLst>
                                   <p:childTnLst>
                                     <p:set>
                                       <p:cBhvr>
-                                        <p:cTn id="34" dur="1" fill="hold">
+                                        <p:cTn id="36" dur="1" fill="hold">
                                           <p:stCondLst>
                                             <p:cond delay="0"/>
                                           </p:stCondLst>
@@ -13120,7 +13547,7 @@
                                         <p:tgtEl>
                                           <p:spTgt spid="3">
                                             <p:txEl>
-                                              <p:pRg st="5" end="5"/>
+                                              <p:pRg st="4" end="4"/>
                                             </p:txEl>
                                           </p:spTgt>
                                         </p:tgtEl>
@@ -13134,11 +13561,11 @@
                                     </p:set>
                                     <p:animEffect transition="in" filter="fade">
                                       <p:cBhvr>
-                                        <p:cTn id="35" dur="500"/>
+                                        <p:cTn id="37" dur="500"/>
                                         <p:tgtEl>
                                           <p:spTgt spid="3">
                                             <p:txEl>
-                                              <p:pRg st="5" end="5"/>
+                                              <p:pRg st="4" end="4"/>
                                             </p:txEl>
                                           </p:spTgt>
                                         </p:tgtEl>
@@ -13154,26 +13581,26 @@
                     </p:cTn>
                   </p:par>
                   <p:par>
-                    <p:cTn id="36" fill="hold">
+                    <p:cTn id="38" fill="hold">
                       <p:stCondLst>
                         <p:cond delay="indefinite"/>
                       </p:stCondLst>
                       <p:childTnLst>
                         <p:par>
-                          <p:cTn id="37" fill="hold">
+                          <p:cTn id="39" fill="hold">
                             <p:stCondLst>
                               <p:cond delay="0"/>
                             </p:stCondLst>
                             <p:childTnLst>
                               <p:par>
-                                <p:cTn id="38" presetID="10" presetClass="entr" presetSubtype="0" fill="hold" grpId="0" nodeType="clickEffect">
+                                <p:cTn id="40" presetID="10" presetClass="entr" presetSubtype="0" fill="hold" grpId="0" nodeType="clickEffect">
                                   <p:stCondLst>
                                     <p:cond delay="0"/>
                                   </p:stCondLst>
                                   <p:childTnLst>
                                     <p:set>
                                       <p:cBhvr>
-                                        <p:cTn id="39" dur="1" fill="hold">
+                                        <p:cTn id="41" dur="1" fill="hold">
                                           <p:stCondLst>
                                             <p:cond delay="0"/>
                                           </p:stCondLst>
@@ -13181,7 +13608,7 @@
                                         <p:tgtEl>
                                           <p:spTgt spid="3">
                                             <p:txEl>
-                                              <p:pRg st="4" end="4"/>
+                                              <p:pRg st="7" end="7"/>
                                             </p:txEl>
                                           </p:spTgt>
                                         </p:tgtEl>
@@ -13195,11 +13622,11 @@
                                     </p:set>
                                     <p:animEffect transition="in" filter="fade">
                                       <p:cBhvr>
-                                        <p:cTn id="40" dur="500"/>
+                                        <p:cTn id="42" dur="500"/>
                                         <p:tgtEl>
                                           <p:spTgt spid="3">
                                             <p:txEl>
-                                              <p:pRg st="4" end="4"/>
+                                              <p:pRg st="7" end="7"/>
                                             </p:txEl>
                                           </p:spTgt>
                                         </p:tgtEl>
@@ -13215,26 +13642,26 @@
                     </p:cTn>
                   </p:par>
                   <p:par>
-                    <p:cTn id="41" fill="hold">
+                    <p:cTn id="43" fill="hold">
                       <p:stCondLst>
                         <p:cond delay="indefinite"/>
                       </p:stCondLst>
                       <p:childTnLst>
                         <p:par>
-                          <p:cTn id="42" fill="hold">
+                          <p:cTn id="44" fill="hold">
                             <p:stCondLst>
                               <p:cond delay="0"/>
                             </p:stCondLst>
                             <p:childTnLst>
                               <p:par>
-                                <p:cTn id="43" presetID="10" presetClass="entr" presetSubtype="0" fill="hold" grpId="0" nodeType="clickEffect">
+                                <p:cTn id="45" presetID="10" presetClass="entr" presetSubtype="0" fill="hold" grpId="0" nodeType="clickEffect">
                                   <p:stCondLst>
                                     <p:cond delay="0"/>
                                   </p:stCondLst>
                                   <p:childTnLst>
                                     <p:set>
                                       <p:cBhvr>
-                                        <p:cTn id="44" dur="1" fill="hold">
+                                        <p:cTn id="46" dur="1" fill="hold">
                                           <p:stCondLst>
                                             <p:cond delay="0"/>
                                           </p:stCondLst>
@@ -13242,7 +13669,7 @@
                                         <p:tgtEl>
                                           <p:spTgt spid="3">
                                             <p:txEl>
-                                              <p:pRg st="7" end="7"/>
+                                              <p:pRg st="9" end="9"/>
                                             </p:txEl>
                                           </p:spTgt>
                                         </p:tgtEl>
@@ -13256,11 +13683,11 @@
                                     </p:set>
                                     <p:animEffect transition="in" filter="fade">
                                       <p:cBhvr>
-                                        <p:cTn id="45" dur="500"/>
+                                        <p:cTn id="47" dur="500"/>
                                         <p:tgtEl>
                                           <p:spTgt spid="3">
                                             <p:txEl>
-                                              <p:pRg st="7" end="7"/>
+                                              <p:pRg st="9" end="9"/>
                                             </p:txEl>
                                           </p:spTgt>
                                         </p:tgtEl>
@@ -13478,7 +13905,7 @@
           <a:p>
             <a:r>
               <a:rPr lang="en-US" b="1" dirty="0" err="1"/>
-              <a:t>MailIsHereFlag</a:t>
+              <a:t>WaitingOnMailPickupFlag</a:t>
             </a:r>
             <a:r>
               <a:rPr lang="en-US" dirty="0"/>
@@ -18341,7 +18768,14 @@
           <a:p>
             <a:r>
               <a:rPr lang="en-US" dirty="0"/>
-              <a:t>New SQL Server ‘19 Design Assistance Warning Message</a:t>
+              <a:t>New SQL Server ’22 AI Assisted Design </a:t>
+            </a:r>
+            <a:br>
+              <a:rPr lang="en-US" dirty="0"/>
+            </a:br>
+            <a:r>
+              <a:rPr lang="en-US" dirty="0"/>
+              <a:t>Warning Message</a:t>
             </a:r>
           </a:p>
         </p:txBody>
@@ -18354,7 +18788,7 @@
         </p:nvSpPr>
         <p:spPr>
           <a:xfrm>
-            <a:off x="1308100" y="6124061"/>
+            <a:off x="1308100" y="6044343"/>
             <a:ext cx="9372600" cy="369332"/>
           </a:xfrm>
           <a:prstGeom prst="rect">
@@ -18395,8 +18829,8 @@
         </p:nvSpPr>
         <p:spPr>
           <a:xfrm>
-            <a:off x="1308100" y="6423353"/>
-            <a:ext cx="9372600" cy="369332"/>
+            <a:off x="1308100" y="6408965"/>
+            <a:ext cx="9575800" cy="369332"/>
           </a:xfrm>
           <a:prstGeom prst="rect">
             <a:avLst/>
@@ -18417,7 +18851,7 @@
               <a:rPr lang="en-US" sz="1800" dirty="0">
                 <a:latin typeface="+mn-lt"/>
               </a:rPr>
-              <a:t>Oh, wait, I think this is SQL Server 3019… Until then, we have to do this work on our own.</a:t>
+              <a:t>Not yet, maybe some day when AI can read your requirements, your data model, and your mind.</a:t>
             </a:r>
           </a:p>
         </p:txBody>
@@ -20985,34 +21419,34 @@
           <a:lstStyle/>
           <a:p>
             <a:r>
-              <a:rPr lang="en-US"/>
+              <a:rPr lang="en-US" dirty="0"/>
               <a:t>Basic shaping of data for the engine </a:t>
             </a:r>
           </a:p>
           <a:p>
             <a:r>
-              <a:rPr lang="en-US"/>
-              <a:t>Data broken down to it’s lowest form</a:t>
+              <a:rPr lang="en-US" dirty="0"/>
+              <a:t>Data broken down to its lowest form</a:t>
             </a:r>
           </a:p>
           <a:p>
             <a:pPr lvl="1"/>
             <a:r>
-              <a:rPr lang="en-US"/>
+              <a:rPr lang="en-US" dirty="0"/>
               <a:t>Column Values are atomic</a:t>
             </a:r>
           </a:p>
           <a:p>
             <a:pPr lvl="1"/>
             <a:r>
-              <a:rPr lang="en-US"/>
+              <a:rPr lang="en-US" dirty="0"/>
               <a:t>No duplicate rows</a:t>
             </a:r>
           </a:p>
           <a:p>
             <a:pPr lvl="1"/>
             <a:r>
-              <a:rPr lang="en-US"/>
+              <a:rPr lang="en-US" dirty="0"/>
               <a:t>All rows must represent the same number of values (Sometimes referenced as “no repeating groups”)</a:t>
             </a:r>
           </a:p>
@@ -33544,7 +33978,7 @@
 </file>
 
 <file path=ppt/slides/slide59.xml><?xml version="1.0" encoding="utf-8"?>
-<p:sld xmlns:a="http://schemas.openxmlformats.org/drawingml/2006/main" xmlns:r="http://schemas.openxmlformats.org/officeDocument/2006/relationships" xmlns:p="http://schemas.openxmlformats.org/presentationml/2006/main" show="0">
+<p:sld xmlns:a="http://schemas.openxmlformats.org/drawingml/2006/main" xmlns:r="http://schemas.openxmlformats.org/officeDocument/2006/relationships" xmlns:p="http://schemas.openxmlformats.org/presentationml/2006/main">
   <p:cSld>
     <p:spTree>
       <p:nvGrpSpPr>
@@ -34535,7 +34969,7 @@
 </file>
 
 <file path=ppt/slides/slide61.xml><?xml version="1.0" encoding="utf-8"?>
-<p:sld xmlns:a="http://schemas.openxmlformats.org/drawingml/2006/main" xmlns:r="http://schemas.openxmlformats.org/officeDocument/2006/relationships" xmlns:p="http://schemas.openxmlformats.org/presentationml/2006/main" show="0">
+<p:sld xmlns:a="http://schemas.openxmlformats.org/drawingml/2006/main" xmlns:r="http://schemas.openxmlformats.org/officeDocument/2006/relationships" xmlns:p="http://schemas.openxmlformats.org/presentationml/2006/main">
   <p:cSld>
     <p:spTree>
       <p:nvGrpSpPr>
@@ -35007,7 +35441,7 @@
 </file>
 
 <file path=ppt/slides/slide62.xml><?xml version="1.0" encoding="utf-8"?>
-<p:sld xmlns:a="http://schemas.openxmlformats.org/drawingml/2006/main" xmlns:r="http://schemas.openxmlformats.org/officeDocument/2006/relationships" xmlns:p="http://schemas.openxmlformats.org/presentationml/2006/main" show="0">
+<p:sld xmlns:a="http://schemas.openxmlformats.org/drawingml/2006/main" xmlns:r="http://schemas.openxmlformats.org/officeDocument/2006/relationships" xmlns:p="http://schemas.openxmlformats.org/presentationml/2006/main">
   <p:cSld>
     <p:spTree>
       <p:nvGrpSpPr>
@@ -35589,7 +36023,7 @@
 </file>
 
 <file path=ppt/slides/slide63.xml><?xml version="1.0" encoding="utf-8"?>
-<p:sld xmlns:a="http://schemas.openxmlformats.org/drawingml/2006/main" xmlns:r="http://schemas.openxmlformats.org/officeDocument/2006/relationships" xmlns:p="http://schemas.openxmlformats.org/presentationml/2006/main" show="0">
+<p:sld xmlns:a="http://schemas.openxmlformats.org/drawingml/2006/main" xmlns:r="http://schemas.openxmlformats.org/officeDocument/2006/relationships" xmlns:p="http://schemas.openxmlformats.org/presentationml/2006/main">
   <p:cSld>
     <p:spTree>
       <p:nvGrpSpPr>
@@ -45428,7 +45862,7 @@
         <p:spPr/>
         <p:txBody>
           <a:bodyPr>
-            <a:normAutofit/>
+            <a:normAutofit fontScale="92500"/>
           </a:bodyPr>
           <a:lstStyle/>
           <a:p>
@@ -45495,14 +45929,36 @@
           <a:p>
             <a:r>
               <a:rPr lang="en-US" dirty="0"/>
-              <a:t>Blog on Simple-Talk</a:t>
+              <a:t>Editor/Blogger at Simple-Talk</a:t>
             </a:r>
             <a:br>
               <a:rPr lang="en-US" dirty="0"/>
             </a:br>
             <a:r>
+              <a:rPr lang="en-US" dirty="0">
+                <a:hlinkClick r:id="rId6"/>
+              </a:rPr>
+              <a:t>https://www.red-gate.com/simple-talk/author/louis-davidson/</a:t>
+            </a:r>
+            <a:r>
               <a:rPr lang="en-US" dirty="0"/>
-              <a:t>https://www.red-gate.com/simple-talk/author/louis-davidson/</a:t>
+              <a:t> </a:t>
+            </a:r>
+          </a:p>
+          <a:p>
+            <a:r>
+              <a:rPr lang="en-US" dirty="0"/>
+              <a:t>(Always looking for new writers! </a:t>
+            </a:r>
+            <a:r>
+              <a:rPr lang="en-US" dirty="0">
+                <a:hlinkClick r:id="rId7"/>
+              </a:rPr>
+              <a:t>editor@simple-talk.com</a:t>
+            </a:r>
+            <a:r>
+              <a:rPr lang="en-US" dirty="0"/>
+              <a:t>)</a:t>
             </a:r>
           </a:p>
         </p:txBody>
@@ -45516,7 +45972,7 @@
           <p:nvPr/>
         </p:nvPicPr>
         <p:blipFill rotWithShape="1">
-          <a:blip r:embed="rId6" cstate="print">
+          <a:blip r:embed="rId8" cstate="print">
             <a:extLst>
               <a:ext uri="{28A0092B-C50C-407E-A947-70E740481C1C}">
                 <a14:useLocalDpi xmlns:a14="http://schemas.microsoft.com/office/drawing/2010/main" val="0"/>
@@ -45528,7 +45984,7 @@
         </p:blipFill>
         <p:spPr>
           <a:xfrm>
-            <a:off x="8282296" y="3200400"/>
+            <a:off x="8153400" y="1905000"/>
             <a:ext cx="3096904" cy="995268"/>
           </a:xfrm>
           <a:prstGeom prst="rect">
@@ -45751,6 +46207,67 @@
                                           <p:spTgt spid="115715">
                                             <p:txEl>
                                               <p:pRg st="5" end="5"/>
+                                            </p:txEl>
+                                          </p:spTgt>
+                                        </p:tgtEl>
+                                      </p:cBhvr>
+                                    </p:animEffect>
+                                  </p:childTnLst>
+                                </p:cTn>
+                              </p:par>
+                            </p:childTnLst>
+                          </p:cTn>
+                        </p:par>
+                      </p:childTnLst>
+                    </p:cTn>
+                  </p:par>
+                  <p:par>
+                    <p:cTn id="19" fill="hold">
+                      <p:stCondLst>
+                        <p:cond delay="indefinite"/>
+                      </p:stCondLst>
+                      <p:childTnLst>
+                        <p:par>
+                          <p:cTn id="20" fill="hold">
+                            <p:stCondLst>
+                              <p:cond delay="0"/>
+                            </p:stCondLst>
+                            <p:childTnLst>
+                              <p:par>
+                                <p:cTn id="21" presetID="10" presetClass="entr" presetSubtype="0" fill="hold" grpId="0" nodeType="clickEffect">
+                                  <p:stCondLst>
+                                    <p:cond delay="0"/>
+                                  </p:stCondLst>
+                                  <p:childTnLst>
+                                    <p:set>
+                                      <p:cBhvr>
+                                        <p:cTn id="22" dur="1" fill="hold">
+                                          <p:stCondLst>
+                                            <p:cond delay="0"/>
+                                          </p:stCondLst>
+                                        </p:cTn>
+                                        <p:tgtEl>
+                                          <p:spTgt spid="115715">
+                                            <p:txEl>
+                                              <p:pRg st="6" end="6"/>
+                                            </p:txEl>
+                                          </p:spTgt>
+                                        </p:tgtEl>
+                                        <p:attrNameLst>
+                                          <p:attrName>style.visibility</p:attrName>
+                                        </p:attrNameLst>
+                                      </p:cBhvr>
+                                      <p:to>
+                                        <p:strVal val="visible"/>
+                                      </p:to>
+                                    </p:set>
+                                    <p:animEffect transition="in" filter="fade">
+                                      <p:cBhvr>
+                                        <p:cTn id="23" dur="500"/>
+                                        <p:tgtEl>
+                                          <p:spTgt spid="115715">
+                                            <p:txEl>
+                                              <p:pRg st="6" end="6"/>
                                             </p:txEl>
                                           </p:spTgt>
                                         </p:tgtEl>
@@ -47398,7 +47915,14 @@
 <file path=customXml/itemProps2.xml><?xml version="1.0" encoding="utf-8"?>
 <ds:datastoreItem xmlns:ds="http://schemas.openxmlformats.org/officeDocument/2006/customXml" ds:itemID="{9078F881-4F78-484A-887C-9BDCF65A0564}">
   <ds:schemaRefs>
+    <ds:schemaRef ds:uri="http://purl.org/dc/dcmitype/"/>
+    <ds:schemaRef ds:uri="http://schemas.microsoft.com/office/infopath/2007/PartnerControls"/>
+    <ds:schemaRef ds:uri="http://schemas.microsoft.com/office/2006/documentManagement/types"/>
+    <ds:schemaRef ds:uri="http://purl.org/dc/elements/1.1/"/>
     <ds:schemaRef ds:uri="http://schemas.microsoft.com/office/2006/metadata/properties"/>
+    <ds:schemaRef ds:uri="http://www.w3.org/XML/1998/namespace"/>
+    <ds:schemaRef ds:uri="http://schemas.openxmlformats.org/package/2006/metadata/core-properties"/>
+    <ds:schemaRef ds:uri="http://purl.org/dc/terms/"/>
   </ds:schemaRefs>
 </ds:datastoreItem>
 </file>
</xml_diff>